<commit_message>
add more progress on ARCO NB
</commit_message>
<xml_diff>
--- a/book/img/ApRES_data_diagram.pptx
+++ b/book/img/ApRES_data_diagram.pptx
@@ -5,7 +5,7 @@
     <p:sldMasterId id="2147483648" r:id="rId1"/>
   </p:sldMasterIdLst>
   <p:sldIdLst>
-    <p:sldId id="256" r:id="rId2"/>
+    <p:sldId id="257" r:id="rId2"/>
   </p:sldIdLst>
   <p:sldSz cx="12192000" cy="6858000"/>
   <p:notesSz cx="6858000" cy="9144000"/>
@@ -3409,7 +3409,7 @@
                 <a:ea typeface="Apple Symbols" panose="02000000000000000000" pitchFamily="2" charset="-79"/>
                 <a:cs typeface="Arial" panose="020B0604020202020204" pitchFamily="34" charset="0"/>
               </a:rPr>
-              <a:t>Chirp sample (40,000)</a:t>
+              <a:t>Chirp sample (40,001)</a:t>
             </a:r>
           </a:p>
         </p:txBody>
@@ -5019,7 +5019,7 @@
           <a:noFill/>
         </p:spPr>
         <p:txBody>
-          <a:bodyPr wrap="none" rtlCol="0">
+          <a:bodyPr wrap="square" rtlCol="0">
             <a:spAutoFit/>
           </a:bodyPr>
           <a:lstStyle/>
@@ -5030,7 +5030,7 @@
                 <a:ea typeface="Apple Symbols" panose="02000000000000000000" pitchFamily="2" charset="-79"/>
                 <a:cs typeface="Arial" panose="020B0604020202020204" pitchFamily="34" charset="0"/>
               </a:rPr>
-              <a:t>Chirp sample (40,000)</a:t>
+              <a:t>Chirp sample (40,001)</a:t>
             </a:r>
           </a:p>
         </p:txBody>
@@ -5058,7 +5058,7 @@
           <a:noFill/>
         </p:spPr>
         <p:txBody>
-          <a:bodyPr wrap="none" rtlCol="0">
+          <a:bodyPr wrap="square" rtlCol="0">
             <a:spAutoFit/>
           </a:bodyPr>
           <a:lstStyle/>
@@ -5097,7 +5097,7 @@
           <a:noFill/>
         </p:spPr>
         <p:txBody>
-          <a:bodyPr wrap="none" rtlCol="0">
+          <a:bodyPr wrap="square" rtlCol="0">
             <a:spAutoFit/>
           </a:bodyPr>
           <a:lstStyle/>
@@ -5160,7 +5160,9 @@
               </a:ext>
             </a:extLst>
           </p:cNvPr>
-          <p:cNvCxnSpPr/>
+          <p:cNvCxnSpPr>
+            <a:cxnSpLocks/>
+          </p:cNvCxnSpPr>
           <p:nvPr/>
         </p:nvCxnSpPr>
         <p:spPr>
@@ -5196,7 +5198,9 @@
               </a:ext>
             </a:extLst>
           </p:cNvPr>
-          <p:cNvCxnSpPr/>
+          <p:cNvCxnSpPr>
+            <a:cxnSpLocks/>
+          </p:cNvCxnSpPr>
           <p:nvPr/>
         </p:nvCxnSpPr>
         <p:spPr>
@@ -6547,7 +6551,7 @@
           <a:noFill/>
         </p:spPr>
         <p:txBody>
-          <a:bodyPr wrap="none" rtlCol="0">
+          <a:bodyPr wrap="square" rtlCol="0">
             <a:spAutoFit/>
           </a:bodyPr>
           <a:lstStyle/>
@@ -6566,7 +6570,7 @@
     </p:spTree>
     <p:extLst>
       <p:ext uri="{BB962C8B-B14F-4D97-AF65-F5344CB8AC3E}">
-        <p14:creationId xmlns:p14="http://schemas.microsoft.com/office/powerpoint/2010/main" val="4050583298"/>
+        <p14:creationId xmlns:p14="http://schemas.microsoft.com/office/powerpoint/2010/main" val="1518257688"/>
       </p:ext>
     </p:extLst>
   </p:cSld>

</xml_diff>